<commit_message>
adding in Angelica's work on the home page (initial commit)
</commit_message>
<xml_diff>
--- a/Frontend design.pptx
+++ b/Frontend design.pptx
@@ -6,11 +6,14 @@
   </p:sldMasterIdLst>
   <p:sldIdLst>
     <p:sldId id="256" r:id="rId2"/>
-    <p:sldId id="257" r:id="rId3"/>
-    <p:sldId id="258" r:id="rId4"/>
-    <p:sldId id="259" r:id="rId5"/>
-    <p:sldId id="260" r:id="rId6"/>
-    <p:sldId id="261" r:id="rId7"/>
+    <p:sldId id="261" r:id="rId3"/>
+    <p:sldId id="257" r:id="rId4"/>
+    <p:sldId id="258" r:id="rId5"/>
+    <p:sldId id="263" r:id="rId6"/>
+    <p:sldId id="264" r:id="rId7"/>
+    <p:sldId id="262" r:id="rId8"/>
+    <p:sldId id="259" r:id="rId9"/>
+    <p:sldId id="260" r:id="rId10"/>
   </p:sldIdLst>
   <p:sldSz cx="9144000" cy="6858000" type="screen4x3"/>
   <p:notesSz cx="6858000" cy="9144000"/>
@@ -293,7 +296,7 @@
           <a:p>
             <a:fld id="{D45B151E-A71F-4604-90CB-CEBEFF0EE307}" type="datetimeFigureOut">
               <a:rPr lang="en-US" smtClean="0"/>
-              <a:t>1/25/2014</a:t>
+              <a:t>1/27/2014</a:t>
             </a:fld>
             <a:endParaRPr lang="en-US"/>
           </a:p>
@@ -463,7 +466,7 @@
           <a:p>
             <a:fld id="{D45B151E-A71F-4604-90CB-CEBEFF0EE307}" type="datetimeFigureOut">
               <a:rPr lang="en-US" smtClean="0"/>
-              <a:t>1/25/2014</a:t>
+              <a:t>1/27/2014</a:t>
             </a:fld>
             <a:endParaRPr lang="en-US"/>
           </a:p>
@@ -643,7 +646,7 @@
           <a:p>
             <a:fld id="{D45B151E-A71F-4604-90CB-CEBEFF0EE307}" type="datetimeFigureOut">
               <a:rPr lang="en-US" smtClean="0"/>
-              <a:t>1/25/2014</a:t>
+              <a:t>1/27/2014</a:t>
             </a:fld>
             <a:endParaRPr lang="en-US"/>
           </a:p>
@@ -730,7 +733,7 @@
         <p:spPr>
           <a:xfrm>
             <a:off x="76200" y="152400"/>
-            <a:ext cx="9105250" cy="369332"/>
+            <a:ext cx="9417963" cy="369332"/>
           </a:xfrm>
           <a:prstGeom prst="rect">
             <a:avLst/>
@@ -744,44 +747,23 @@
           <a:p>
             <a:r>
               <a:rPr lang="en-US" dirty="0" smtClean="0"/>
-              <a:t>RRR Logo							About	Mission	Events</a:t>
-            </a:r>
-            <a:endParaRPr lang="en-US" dirty="0"/>
-          </a:p>
-        </p:txBody>
-      </p:sp>
-      <p:sp>
-        <p:nvSpPr>
-          <p:cNvPr id="8" name="Rectangle 7"/>
-          <p:cNvSpPr/>
-          <p:nvPr userDrawn="1"/>
-        </p:nvSpPr>
-        <p:spPr>
-          <a:xfrm>
-            <a:off x="76200" y="6324600"/>
-            <a:ext cx="3488455" cy="369332"/>
-          </a:xfrm>
-          <a:prstGeom prst="rect">
-            <a:avLst/>
-          </a:prstGeom>
-        </p:spPr>
-        <p:txBody>
-          <a:bodyPr wrap="none">
-            <a:spAutoFit/>
-          </a:bodyPr>
-          <a:lstStyle/>
-          <a:p>
+              <a:t>LOGO	</a:t>
+            </a:r>
             <a:r>
               <a:rPr lang="en-US" dirty="0" smtClean="0"/>
-              <a:t>About</a:t>
-            </a:r>
-            <a:r>
-              <a:rPr lang="en-US" baseline="0" dirty="0" smtClean="0"/>
-              <a:t> us	</a:t>
+              <a:t>	</a:t>
             </a:r>
             <a:r>
               <a:rPr lang="en-US" dirty="0" smtClean="0"/>
-              <a:t>Contact us	Apply</a:t>
+              <a:t>	</a:t>
+            </a:r>
+            <a:r>
+              <a:rPr lang="en-US" dirty="0" smtClean="0"/>
+              <a:t>				About	Mission	</a:t>
+            </a:r>
+            <a:r>
+              <a:rPr lang="en-US" dirty="0" smtClean="0"/>
+              <a:t>Events</a:t>
             </a:r>
             <a:endParaRPr lang="en-US" dirty="0"/>
           </a:p>
@@ -992,7 +974,7 @@
           <a:p>
             <a:fld id="{D45B151E-A71F-4604-90CB-CEBEFF0EE307}" type="datetimeFigureOut">
               <a:rPr lang="en-US" smtClean="0"/>
-              <a:t>1/25/2014</a:t>
+              <a:t>1/27/2014</a:t>
             </a:fld>
             <a:endParaRPr lang="en-US"/>
           </a:p>
@@ -1280,7 +1262,7 @@
           <a:p>
             <a:fld id="{D45B151E-A71F-4604-90CB-CEBEFF0EE307}" type="datetimeFigureOut">
               <a:rPr lang="en-US" smtClean="0"/>
-              <a:t>1/25/2014</a:t>
+              <a:t>1/27/2014</a:t>
             </a:fld>
             <a:endParaRPr lang="en-US"/>
           </a:p>
@@ -1702,7 +1684,7 @@
           <a:p>
             <a:fld id="{D45B151E-A71F-4604-90CB-CEBEFF0EE307}" type="datetimeFigureOut">
               <a:rPr lang="en-US" smtClean="0"/>
-              <a:t>1/25/2014</a:t>
+              <a:t>1/27/2014</a:t>
             </a:fld>
             <a:endParaRPr lang="en-US"/>
           </a:p>
@@ -1820,7 +1802,7 @@
           <a:p>
             <a:fld id="{D45B151E-A71F-4604-90CB-CEBEFF0EE307}" type="datetimeFigureOut">
               <a:rPr lang="en-US" smtClean="0"/>
-              <a:t>1/25/2014</a:t>
+              <a:t>1/27/2014</a:t>
             </a:fld>
             <a:endParaRPr lang="en-US"/>
           </a:p>
@@ -1915,7 +1897,7 @@
           <a:p>
             <a:fld id="{D45B151E-A71F-4604-90CB-CEBEFF0EE307}" type="datetimeFigureOut">
               <a:rPr lang="en-US" smtClean="0"/>
-              <a:t>1/25/2014</a:t>
+              <a:t>1/27/2014</a:t>
             </a:fld>
             <a:endParaRPr lang="en-US"/>
           </a:p>
@@ -2192,7 +2174,7 @@
           <a:p>
             <a:fld id="{D45B151E-A71F-4604-90CB-CEBEFF0EE307}" type="datetimeFigureOut">
               <a:rPr lang="en-US" smtClean="0"/>
-              <a:t>1/25/2014</a:t>
+              <a:t>1/27/2014</a:t>
             </a:fld>
             <a:endParaRPr lang="en-US"/>
           </a:p>
@@ -2445,7 +2427,7 @@
           <a:p>
             <a:fld id="{D45B151E-A71F-4604-90CB-CEBEFF0EE307}" type="datetimeFigureOut">
               <a:rPr lang="en-US" smtClean="0"/>
-              <a:t>1/25/2014</a:t>
+              <a:t>1/27/2014</a:t>
             </a:fld>
             <a:endParaRPr lang="en-US"/>
           </a:p>
@@ -2658,7 +2640,7 @@
           <a:p>
             <a:fld id="{D45B151E-A71F-4604-90CB-CEBEFF0EE307}" type="datetimeFigureOut">
               <a:rPr lang="en-US" smtClean="0"/>
-              <a:t>1/25/2014</a:t>
+              <a:t>1/27/2014</a:t>
             </a:fld>
             <a:endParaRPr lang="en-US"/>
           </a:p>
@@ -3042,7 +3024,7 @@
         <p:spPr>
           <a:xfrm>
             <a:off x="0" y="762000"/>
-            <a:ext cx="9144000" cy="5334000"/>
+            <a:ext cx="9144000" cy="2819400"/>
           </a:xfrm>
           <a:prstGeom prst="rect">
             <a:avLst/>
@@ -3081,7 +3063,7 @@
         </p:nvSpPr>
         <p:spPr>
           <a:xfrm>
-            <a:off x="6934200" y="3080139"/>
+            <a:off x="3429000" y="2756973"/>
             <a:ext cx="1905000" cy="646331"/>
           </a:xfrm>
           <a:prstGeom prst="rect">
@@ -3123,36 +3105,6 @@
       </p:sp>
       <p:sp>
         <p:nvSpPr>
-          <p:cNvPr id="6" name="TextBox 5"/>
-          <p:cNvSpPr txBox="1"/>
-          <p:nvPr/>
-        </p:nvSpPr>
-        <p:spPr>
-          <a:xfrm>
-            <a:off x="1600200" y="2057400"/>
-            <a:ext cx="2209800" cy="369332"/>
-          </a:xfrm>
-          <a:prstGeom prst="rect">
-            <a:avLst/>
-          </a:prstGeom>
-          <a:noFill/>
-        </p:spPr>
-        <p:txBody>
-          <a:bodyPr wrap="square" rtlCol="0">
-            <a:spAutoFit/>
-          </a:bodyPr>
-          <a:lstStyle/>
-          <a:p>
-            <a:r>
-              <a:rPr lang="en-US" dirty="0" smtClean="0"/>
-              <a:t>Image</a:t>
-            </a:r>
-            <a:endParaRPr lang="en-US" dirty="0"/>
-          </a:p>
-        </p:txBody>
-      </p:sp>
-      <p:sp>
-        <p:nvSpPr>
           <p:cNvPr id="11" name="TextBox 10"/>
           <p:cNvSpPr txBox="1"/>
           <p:nvPr/>
@@ -3187,6 +3139,94 @@
                 <a:schemeClr val="accent2"/>
               </a:solidFill>
             </a:endParaRPr>
+          </a:p>
+        </p:txBody>
+      </p:sp>
+      <p:sp>
+        <p:nvSpPr>
+          <p:cNvPr id="2" name="Rectangle 1"/>
+          <p:cNvSpPr/>
+          <p:nvPr/>
+        </p:nvSpPr>
+        <p:spPr>
+          <a:xfrm>
+            <a:off x="0" y="3962400"/>
+            <a:ext cx="9144000" cy="2286000"/>
+          </a:xfrm>
+          <a:prstGeom prst="rect">
+            <a:avLst/>
+          </a:prstGeom>
+        </p:spPr>
+        <p:style>
+          <a:lnRef idx="2">
+            <a:schemeClr val="accent1">
+              <a:shade val="50000"/>
+            </a:schemeClr>
+          </a:lnRef>
+          <a:fillRef idx="1">
+            <a:schemeClr val="accent1"/>
+          </a:fillRef>
+          <a:effectRef idx="0">
+            <a:schemeClr val="accent1"/>
+          </a:effectRef>
+          <a:fontRef idx="minor">
+            <a:schemeClr val="lt1"/>
+          </a:fontRef>
+        </p:style>
+        <p:txBody>
+          <a:bodyPr rtlCol="0" anchor="ctr"/>
+          <a:lstStyle/>
+          <a:p>
+            <a:pPr algn="ctr"/>
+            <a:r>
+              <a:rPr lang="en-US" dirty="0" smtClean="0"/>
+              <a:t>Scrolling stuff</a:t>
+            </a:r>
+            <a:endParaRPr lang="en-US" dirty="0"/>
+          </a:p>
+        </p:txBody>
+      </p:sp>
+      <p:sp>
+        <p:nvSpPr>
+          <p:cNvPr id="3" name="Rectangle 2"/>
+          <p:cNvSpPr/>
+          <p:nvPr/>
+        </p:nvSpPr>
+        <p:spPr>
+          <a:xfrm>
+            <a:off x="0" y="6400800"/>
+            <a:ext cx="9144000" cy="457200"/>
+          </a:xfrm>
+          <a:prstGeom prst="rect">
+            <a:avLst/>
+          </a:prstGeom>
+        </p:spPr>
+        <p:style>
+          <a:lnRef idx="2">
+            <a:schemeClr val="accent1">
+              <a:shade val="50000"/>
+            </a:schemeClr>
+          </a:lnRef>
+          <a:fillRef idx="1">
+            <a:schemeClr val="accent1"/>
+          </a:fillRef>
+          <a:effectRef idx="0">
+            <a:schemeClr val="accent1"/>
+          </a:effectRef>
+          <a:fontRef idx="minor">
+            <a:schemeClr val="lt1"/>
+          </a:fontRef>
+        </p:style>
+        <p:txBody>
+          <a:bodyPr rtlCol="0" anchor="ctr"/>
+          <a:lstStyle/>
+          <a:p>
+            <a:pPr algn="ctr"/>
+            <a:r>
+              <a:rPr lang="en-US" dirty="0" smtClean="0"/>
+              <a:t>Footer</a:t>
+            </a:r>
+            <a:endParaRPr lang="en-US" dirty="0"/>
           </a:p>
         </p:txBody>
       </p:sp>
@@ -3229,14 +3269,53 @@
       </p:grpSpPr>
       <p:sp>
         <p:nvSpPr>
-          <p:cNvPr id="10" name="Rectangle 9"/>
+          <p:cNvPr id="2" name="TextBox 1"/>
+          <p:cNvSpPr txBox="1"/>
+          <p:nvPr/>
+        </p:nvSpPr>
+        <p:spPr>
+          <a:xfrm>
+            <a:off x="4191262" y="838200"/>
+            <a:ext cx="1143262" cy="553998"/>
+          </a:xfrm>
+          <a:prstGeom prst="rect">
+            <a:avLst/>
+          </a:prstGeom>
+          <a:noFill/>
+        </p:spPr>
+        <p:txBody>
+          <a:bodyPr wrap="none" rtlCol="0">
+            <a:spAutoFit/>
+          </a:bodyPr>
+          <a:lstStyle/>
+          <a:p>
+            <a:pPr algn="ctr"/>
+            <a:r>
+              <a:rPr lang="en-US" sz="3000" dirty="0" smtClean="0">
+                <a:solidFill>
+                  <a:schemeClr val="accent2"/>
+                </a:solidFill>
+              </a:rPr>
+              <a:t>About</a:t>
+            </a:r>
+            <a:endParaRPr lang="en-US" sz="3000" dirty="0">
+              <a:solidFill>
+                <a:schemeClr val="accent2"/>
+              </a:solidFill>
+            </a:endParaRPr>
+          </a:p>
+        </p:txBody>
+      </p:sp>
+      <p:sp>
+        <p:nvSpPr>
+          <p:cNvPr id="3" name="Rectangle 2"/>
           <p:cNvSpPr/>
           <p:nvPr/>
         </p:nvSpPr>
         <p:spPr>
           <a:xfrm>
-            <a:off x="3886200" y="2133600"/>
-            <a:ext cx="1295400" cy="762000"/>
+            <a:off x="762000" y="1497842"/>
+            <a:ext cx="7543800" cy="2743200"/>
           </a:xfrm>
           <a:prstGeom prst="rect">
             <a:avLst/>
@@ -3265,7 +3344,7 @@
             <a:pPr algn="ctr"/>
             <a:r>
               <a:rPr lang="en-US" dirty="0" smtClean="0"/>
-              <a:t>Replay</a:t>
+              <a:t>About RRR</a:t>
             </a:r>
             <a:endParaRPr lang="en-US" dirty="0"/>
           </a:p>
@@ -3273,14 +3352,14 @@
       </p:sp>
       <p:sp>
         <p:nvSpPr>
-          <p:cNvPr id="9" name="Rectangle 8"/>
+          <p:cNvPr id="4" name="Rectangle 3"/>
           <p:cNvSpPr/>
           <p:nvPr/>
         </p:nvSpPr>
         <p:spPr>
           <a:xfrm>
-            <a:off x="1216925" y="2133600"/>
-            <a:ext cx="1371600" cy="762000"/>
+            <a:off x="727881" y="4545842"/>
+            <a:ext cx="1371600" cy="1371600"/>
           </a:xfrm>
           <a:prstGeom prst="rect">
             <a:avLst/>
@@ -3309,7 +3388,7 @@
             <a:pPr algn="ctr"/>
             <a:r>
               <a:rPr lang="en-US" dirty="0" smtClean="0"/>
-              <a:t>Record</a:t>
+              <a:t>Team member</a:t>
             </a:r>
             <a:endParaRPr lang="en-US" dirty="0"/>
           </a:p>
@@ -3317,52 +3396,14 @@
       </p:sp>
       <p:sp>
         <p:nvSpPr>
-          <p:cNvPr id="4" name="TextBox 3"/>
-          <p:cNvSpPr txBox="1"/>
-          <p:nvPr/>
-        </p:nvSpPr>
-        <p:spPr>
-          <a:xfrm>
-            <a:off x="3276600" y="685800"/>
-            <a:ext cx="5105400" cy="553998"/>
-          </a:xfrm>
-          <a:prstGeom prst="rect">
-            <a:avLst/>
-          </a:prstGeom>
-          <a:noFill/>
-        </p:spPr>
-        <p:txBody>
-          <a:bodyPr wrap="square" rtlCol="0">
-            <a:spAutoFit/>
-          </a:bodyPr>
-          <a:lstStyle/>
-          <a:p>
-            <a:r>
-              <a:rPr lang="en-US" sz="3000" dirty="0" smtClean="0">
-                <a:solidFill>
-                  <a:schemeClr val="accent2"/>
-                </a:solidFill>
-              </a:rPr>
-              <a:t>Create Account</a:t>
-            </a:r>
-            <a:endParaRPr lang="en-US" sz="3000" dirty="0">
-              <a:solidFill>
-                <a:schemeClr val="accent2"/>
-              </a:solidFill>
-            </a:endParaRPr>
-          </a:p>
-        </p:txBody>
-      </p:sp>
-      <p:sp>
-        <p:nvSpPr>
-          <p:cNvPr id="11" name="Rectangle 10"/>
+          <p:cNvPr id="6" name="Rectangle 5"/>
           <p:cNvSpPr/>
           <p:nvPr/>
         </p:nvSpPr>
         <p:spPr>
           <a:xfrm>
-            <a:off x="6596418" y="2133600"/>
-            <a:ext cx="1295400" cy="762000"/>
+            <a:off x="2362200" y="4545842"/>
+            <a:ext cx="1371600" cy="1371600"/>
           </a:xfrm>
           <a:prstGeom prst="rect">
             <a:avLst/>
@@ -3391,7 +3432,169 @@
             <a:pPr algn="ctr"/>
             <a:r>
               <a:rPr lang="en-US" dirty="0" smtClean="0"/>
-              <a:t>Review</a:t>
+              <a:t>Team member</a:t>
+            </a:r>
+            <a:endParaRPr lang="en-US" dirty="0"/>
+          </a:p>
+        </p:txBody>
+      </p:sp>
+      <p:sp>
+        <p:nvSpPr>
+          <p:cNvPr id="7" name="Rectangle 6"/>
+          <p:cNvSpPr/>
+          <p:nvPr/>
+        </p:nvSpPr>
+        <p:spPr>
+          <a:xfrm>
+            <a:off x="3886200" y="4545842"/>
+            <a:ext cx="1371600" cy="1371600"/>
+          </a:xfrm>
+          <a:prstGeom prst="rect">
+            <a:avLst/>
+          </a:prstGeom>
+        </p:spPr>
+        <p:style>
+          <a:lnRef idx="2">
+            <a:schemeClr val="accent1">
+              <a:shade val="50000"/>
+            </a:schemeClr>
+          </a:lnRef>
+          <a:fillRef idx="1">
+            <a:schemeClr val="accent1"/>
+          </a:fillRef>
+          <a:effectRef idx="0">
+            <a:schemeClr val="accent1"/>
+          </a:effectRef>
+          <a:fontRef idx="minor">
+            <a:schemeClr val="lt1"/>
+          </a:fontRef>
+        </p:style>
+        <p:txBody>
+          <a:bodyPr rtlCol="0" anchor="ctr"/>
+          <a:lstStyle/>
+          <a:p>
+            <a:pPr algn="ctr"/>
+            <a:r>
+              <a:rPr lang="en-US" dirty="0" smtClean="0"/>
+              <a:t>Team member</a:t>
+            </a:r>
+            <a:endParaRPr lang="en-US" dirty="0"/>
+          </a:p>
+        </p:txBody>
+      </p:sp>
+      <p:sp>
+        <p:nvSpPr>
+          <p:cNvPr id="8" name="Rectangle 7"/>
+          <p:cNvSpPr/>
+          <p:nvPr/>
+        </p:nvSpPr>
+        <p:spPr>
+          <a:xfrm>
+            <a:off x="5410200" y="4534469"/>
+            <a:ext cx="1371600" cy="1371600"/>
+          </a:xfrm>
+          <a:prstGeom prst="rect">
+            <a:avLst/>
+          </a:prstGeom>
+        </p:spPr>
+        <p:style>
+          <a:lnRef idx="2">
+            <a:schemeClr val="accent1">
+              <a:shade val="50000"/>
+            </a:schemeClr>
+          </a:lnRef>
+          <a:fillRef idx="1">
+            <a:schemeClr val="accent1"/>
+          </a:fillRef>
+          <a:effectRef idx="0">
+            <a:schemeClr val="accent1"/>
+          </a:effectRef>
+          <a:fontRef idx="minor">
+            <a:schemeClr val="lt1"/>
+          </a:fontRef>
+        </p:style>
+        <p:txBody>
+          <a:bodyPr rtlCol="0" anchor="ctr"/>
+          <a:lstStyle/>
+          <a:p>
+            <a:pPr algn="ctr"/>
+            <a:r>
+              <a:rPr lang="en-US" dirty="0" smtClean="0"/>
+              <a:t>Team member</a:t>
+            </a:r>
+            <a:endParaRPr lang="en-US" dirty="0"/>
+          </a:p>
+        </p:txBody>
+      </p:sp>
+      <p:sp>
+        <p:nvSpPr>
+          <p:cNvPr id="9" name="Rectangle 8"/>
+          <p:cNvSpPr/>
+          <p:nvPr/>
+        </p:nvSpPr>
+        <p:spPr>
+          <a:xfrm>
+            <a:off x="6934200" y="4534469"/>
+            <a:ext cx="1371600" cy="1371600"/>
+          </a:xfrm>
+          <a:prstGeom prst="rect">
+            <a:avLst/>
+          </a:prstGeom>
+        </p:spPr>
+        <p:style>
+          <a:lnRef idx="2">
+            <a:schemeClr val="accent1">
+              <a:shade val="50000"/>
+            </a:schemeClr>
+          </a:lnRef>
+          <a:fillRef idx="1">
+            <a:schemeClr val="accent1"/>
+          </a:fillRef>
+          <a:effectRef idx="0">
+            <a:schemeClr val="accent1"/>
+          </a:effectRef>
+          <a:fontRef idx="minor">
+            <a:schemeClr val="lt1"/>
+          </a:fontRef>
+        </p:style>
+        <p:txBody>
+          <a:bodyPr rtlCol="0" anchor="ctr"/>
+          <a:lstStyle/>
+          <a:p>
+            <a:pPr algn="ctr"/>
+            <a:r>
+              <a:rPr lang="en-US" dirty="0" smtClean="0"/>
+              <a:t>Team member</a:t>
+            </a:r>
+            <a:endParaRPr lang="en-US" dirty="0"/>
+          </a:p>
+        </p:txBody>
+      </p:sp>
+      <p:sp>
+        <p:nvSpPr>
+          <p:cNvPr id="10" name="TextBox 9"/>
+          <p:cNvSpPr txBox="1"/>
+          <p:nvPr/>
+        </p:nvSpPr>
+        <p:spPr>
+          <a:xfrm>
+            <a:off x="4533900" y="6063734"/>
+            <a:ext cx="3321807" cy="369332"/>
+          </a:xfrm>
+          <a:prstGeom prst="rect">
+            <a:avLst/>
+          </a:prstGeom>
+          <a:noFill/>
+        </p:spPr>
+        <p:txBody>
+          <a:bodyPr wrap="none" rtlCol="0">
+            <a:spAutoFit/>
+          </a:bodyPr>
+          <a:lstStyle/>
+          <a:p>
+            <a:r>
+              <a:rPr lang="en-US" dirty="0" smtClean="0"/>
+              <a:t>Mouse over pictures for short bio</a:t>
             </a:r>
             <a:endParaRPr lang="en-US" dirty="0"/>
           </a:p>
@@ -3400,7 +3603,7 @@
     </p:spTree>
     <p:extLst>
       <p:ext uri="{BB962C8B-B14F-4D97-AF65-F5344CB8AC3E}">
-        <p14:creationId xmlns:p14="http://schemas.microsoft.com/office/powerpoint/2010/main" val="483329137"/>
+        <p14:creationId xmlns:p14="http://schemas.microsoft.com/office/powerpoint/2010/main" val="2136350444"/>
       </p:ext>
     </p:extLst>
   </p:cSld>
@@ -3436,53 +3639,14 @@
       </p:grpSpPr>
       <p:sp>
         <p:nvSpPr>
-          <p:cNvPr id="4" name="TextBox 3"/>
-          <p:cNvSpPr txBox="1"/>
-          <p:nvPr/>
-        </p:nvSpPr>
-        <p:spPr>
-          <a:xfrm>
-            <a:off x="2133600" y="838200"/>
-            <a:ext cx="4038600" cy="553998"/>
-          </a:xfrm>
-          <a:prstGeom prst="rect">
-            <a:avLst/>
-          </a:prstGeom>
-          <a:noFill/>
-        </p:spPr>
-        <p:txBody>
-          <a:bodyPr wrap="square" rtlCol="0">
-            <a:spAutoFit/>
-          </a:bodyPr>
-          <a:lstStyle/>
-          <a:p>
-            <a:pPr algn="ctr"/>
-            <a:r>
-              <a:rPr lang="en-US" sz="3000" dirty="0" smtClean="0">
-                <a:solidFill>
-                  <a:schemeClr val="accent2"/>
-                </a:solidFill>
-              </a:rPr>
-              <a:t>Record</a:t>
-            </a:r>
-            <a:endParaRPr lang="en-US" sz="3000" dirty="0">
-              <a:solidFill>
-                <a:schemeClr val="accent2"/>
-              </a:solidFill>
-            </a:endParaRPr>
-          </a:p>
-        </p:txBody>
-      </p:sp>
-      <p:sp>
-        <p:nvSpPr>
-          <p:cNvPr id="7" name="Rectangle 6"/>
+          <p:cNvPr id="10" name="Rectangle 9"/>
           <p:cNvSpPr/>
           <p:nvPr/>
         </p:nvSpPr>
         <p:spPr>
           <a:xfrm>
-            <a:off x="457200" y="1676400"/>
-            <a:ext cx="2057400" cy="4343400"/>
+            <a:off x="3886200" y="2133600"/>
+            <a:ext cx="1295400" cy="762000"/>
           </a:xfrm>
           <a:prstGeom prst="rect">
             <a:avLst/>
@@ -3511,7 +3675,7 @@
             <a:pPr algn="ctr"/>
             <a:r>
               <a:rPr lang="en-US" dirty="0" smtClean="0"/>
-              <a:t>Library sorted by recorded + unrecorded books</a:t>
+              <a:t>Replay</a:t>
             </a:r>
             <a:endParaRPr lang="en-US" dirty="0"/>
           </a:p>
@@ -3519,14 +3683,14 @@
       </p:sp>
       <p:sp>
         <p:nvSpPr>
-          <p:cNvPr id="12" name="Rectangle 11"/>
+          <p:cNvPr id="9" name="Rectangle 8"/>
           <p:cNvSpPr/>
           <p:nvPr/>
         </p:nvSpPr>
         <p:spPr>
           <a:xfrm>
-            <a:off x="2971800" y="2971800"/>
-            <a:ext cx="5715000" cy="3048000"/>
+            <a:off x="1216925" y="2133600"/>
+            <a:ext cx="1371600" cy="762000"/>
           </a:xfrm>
           <a:prstGeom prst="rect">
             <a:avLst/>
@@ -3555,49 +3719,60 @@
             <a:pPr algn="ctr"/>
             <a:r>
               <a:rPr lang="en-US" dirty="0" smtClean="0"/>
-              <a:t>Display recorded chapters</a:t>
-            </a:r>
-          </a:p>
-          <a:p>
-            <a:pPr algn="ctr"/>
-            <a:r>
-              <a:rPr lang="en-US" dirty="0" smtClean="0"/>
-              <a:t>Record new chapter of book</a:t>
-            </a:r>
-          </a:p>
-          <a:p>
-            <a:pPr algn="ctr"/>
-            <a:r>
-              <a:rPr lang="en-US" dirty="0" smtClean="0"/>
-              <a:t>Edit chapter of book</a:t>
-            </a:r>
-          </a:p>
-          <a:p>
-            <a:pPr algn="ctr"/>
-            <a:r>
-              <a:rPr lang="en-US" dirty="0" smtClean="0"/>
-              <a:t>Add comprehension questions</a:t>
-            </a:r>
-          </a:p>
-          <a:p>
-            <a:pPr algn="ctr"/>
-            <a:r>
-              <a:rPr lang="en-US" dirty="0" smtClean="0"/>
-              <a:t>Submit book for review</a:t>
-            </a:r>
-          </a:p>
-        </p:txBody>
-      </p:sp>
-      <p:sp>
-        <p:nvSpPr>
-          <p:cNvPr id="13" name="Rectangle 12"/>
+              <a:t>Record</a:t>
+            </a:r>
+            <a:endParaRPr lang="en-US" dirty="0"/>
+          </a:p>
+        </p:txBody>
+      </p:sp>
+      <p:sp>
+        <p:nvSpPr>
+          <p:cNvPr id="4" name="TextBox 3"/>
+          <p:cNvSpPr txBox="1"/>
+          <p:nvPr/>
+        </p:nvSpPr>
+        <p:spPr>
+          <a:xfrm>
+            <a:off x="3276600" y="685800"/>
+            <a:ext cx="5105400" cy="553998"/>
+          </a:xfrm>
+          <a:prstGeom prst="rect">
+            <a:avLst/>
+          </a:prstGeom>
+          <a:noFill/>
+        </p:spPr>
+        <p:txBody>
+          <a:bodyPr wrap="square" rtlCol="0">
+            <a:spAutoFit/>
+          </a:bodyPr>
+          <a:lstStyle/>
+          <a:p>
+            <a:r>
+              <a:rPr lang="en-US" sz="3000" dirty="0" smtClean="0">
+                <a:solidFill>
+                  <a:schemeClr val="accent2"/>
+                </a:solidFill>
+              </a:rPr>
+              <a:t>Create Account</a:t>
+            </a:r>
+            <a:endParaRPr lang="en-US" sz="3000" dirty="0">
+              <a:solidFill>
+                <a:schemeClr val="accent2"/>
+              </a:solidFill>
+            </a:endParaRPr>
+          </a:p>
+        </p:txBody>
+      </p:sp>
+      <p:sp>
+        <p:nvSpPr>
+          <p:cNvPr id="11" name="Rectangle 10"/>
           <p:cNvSpPr/>
           <p:nvPr/>
         </p:nvSpPr>
         <p:spPr>
           <a:xfrm>
-            <a:off x="2971800" y="1676400"/>
-            <a:ext cx="1181100" cy="1151930"/>
+            <a:off x="6596418" y="2133600"/>
+            <a:ext cx="1295400" cy="762000"/>
           </a:xfrm>
           <a:prstGeom prst="rect">
             <a:avLst/>
@@ -3626,81 +3801,7 @@
             <a:pPr algn="ctr"/>
             <a:r>
               <a:rPr lang="en-US" dirty="0" smtClean="0"/>
-              <a:t>Selected book</a:t>
-            </a:r>
-            <a:endParaRPr lang="en-US" dirty="0"/>
-          </a:p>
-        </p:txBody>
-      </p:sp>
-      <p:sp>
-        <p:nvSpPr>
-          <p:cNvPr id="14" name="Rectangle 13"/>
-          <p:cNvSpPr/>
-          <p:nvPr/>
-        </p:nvSpPr>
-        <p:spPr>
-          <a:xfrm>
-            <a:off x="4572000" y="1676400"/>
-            <a:ext cx="4114800" cy="1151930"/>
-          </a:xfrm>
-          <a:prstGeom prst="rect">
-            <a:avLst/>
-          </a:prstGeom>
-        </p:spPr>
-        <p:style>
-          <a:lnRef idx="2">
-            <a:schemeClr val="accent1">
-              <a:shade val="50000"/>
-            </a:schemeClr>
-          </a:lnRef>
-          <a:fillRef idx="1">
-            <a:schemeClr val="accent1"/>
-          </a:fillRef>
-          <a:effectRef idx="0">
-            <a:schemeClr val="accent1"/>
-          </a:effectRef>
-          <a:fontRef idx="minor">
-            <a:schemeClr val="lt1"/>
-          </a:fontRef>
-        </p:style>
-        <p:txBody>
-          <a:bodyPr rtlCol="0" anchor="ctr"/>
-          <a:lstStyle/>
-          <a:p>
-            <a:pPr algn="ctr"/>
-            <a:r>
-              <a:rPr lang="en-US" dirty="0" smtClean="0"/>
-              <a:t>About selected book</a:t>
-            </a:r>
-            <a:endParaRPr lang="en-US" dirty="0"/>
-          </a:p>
-        </p:txBody>
-      </p:sp>
-      <p:sp>
-        <p:nvSpPr>
-          <p:cNvPr id="15" name="TextBox 14"/>
-          <p:cNvSpPr txBox="1"/>
-          <p:nvPr/>
-        </p:nvSpPr>
-        <p:spPr>
-          <a:xfrm>
-            <a:off x="457200" y="838200"/>
-            <a:ext cx="2057400" cy="369332"/>
-          </a:xfrm>
-          <a:prstGeom prst="rect">
-            <a:avLst/>
-          </a:prstGeom>
-          <a:noFill/>
-        </p:spPr>
-        <p:txBody>
-          <a:bodyPr wrap="square" rtlCol="0">
-            <a:spAutoFit/>
-          </a:bodyPr>
-          <a:lstStyle/>
-          <a:p>
-            <a:r>
-              <a:rPr lang="en-US" dirty="0" smtClean="0"/>
-              <a:t>University affiliation</a:t>
+              <a:t>Review</a:t>
             </a:r>
             <a:endParaRPr lang="en-US" dirty="0"/>
           </a:p>
@@ -3709,7 +3810,7 @@
     </p:spTree>
     <p:extLst>
       <p:ext uri="{BB962C8B-B14F-4D97-AF65-F5344CB8AC3E}">
-        <p14:creationId xmlns:p14="http://schemas.microsoft.com/office/powerpoint/2010/main" val="144905844"/>
+        <p14:creationId xmlns:p14="http://schemas.microsoft.com/office/powerpoint/2010/main" val="483329137"/>
       </p:ext>
     </p:extLst>
   </p:cSld>
@@ -3745,14 +3846,14 @@
       </p:grpSpPr>
       <p:sp>
         <p:nvSpPr>
-          <p:cNvPr id="2" name="TextBox 1"/>
+          <p:cNvPr id="4" name="TextBox 3"/>
           <p:cNvSpPr txBox="1"/>
           <p:nvPr/>
         </p:nvSpPr>
         <p:spPr>
           <a:xfrm>
-            <a:off x="2209800" y="990600"/>
-            <a:ext cx="4876800" cy="553998"/>
+            <a:off x="2133600" y="838200"/>
+            <a:ext cx="4038600" cy="553998"/>
           </a:xfrm>
           <a:prstGeom prst="rect">
             <a:avLst/>
@@ -3772,26 +3873,21 @@
                   <a:schemeClr val="accent2"/>
                 </a:solidFill>
               </a:rPr>
-              <a:t>Replay</a:t>
-            </a:r>
-            <a:endParaRPr lang="en-US" sz="3000" dirty="0">
-              <a:solidFill>
-                <a:schemeClr val="accent2"/>
-              </a:solidFill>
-            </a:endParaRPr>
-          </a:p>
-        </p:txBody>
-      </p:sp>
-      <p:sp>
-        <p:nvSpPr>
-          <p:cNvPr id="3" name="Rectangle 2"/>
+              <a:t>Record Info</a:t>
+            </a:r>
+          </a:p>
+        </p:txBody>
+      </p:sp>
+      <p:sp>
+        <p:nvSpPr>
+          <p:cNvPr id="2" name="Rectangle 1"/>
           <p:cNvSpPr/>
           <p:nvPr/>
         </p:nvSpPr>
         <p:spPr>
           <a:xfrm>
-            <a:off x="304800" y="1544598"/>
-            <a:ext cx="2514600" cy="4627602"/>
+            <a:off x="304800" y="1752600"/>
+            <a:ext cx="1295400" cy="4800600"/>
           </a:xfrm>
           <a:prstGeom prst="rect">
             <a:avLst/>
@@ -3828,14 +3924,14 @@
       </p:sp>
       <p:sp>
         <p:nvSpPr>
-          <p:cNvPr id="4" name="Rectangle 3"/>
+          <p:cNvPr id="3" name="Rectangle 2"/>
           <p:cNvSpPr/>
           <p:nvPr/>
         </p:nvSpPr>
         <p:spPr>
           <a:xfrm>
-            <a:off x="3429000" y="1544598"/>
-            <a:ext cx="2514600" cy="4627602"/>
+            <a:off x="1905000" y="1752600"/>
+            <a:ext cx="7086600" cy="3429000"/>
           </a:xfrm>
           <a:prstGeom prst="rect">
             <a:avLst/>
@@ -3864,7 +3960,7 @@
             <a:pPr algn="ctr"/>
             <a:r>
               <a:rPr lang="en-US" dirty="0" smtClean="0"/>
-              <a:t>Selected book</a:t>
+              <a:t>Form about new book</a:t>
             </a:r>
             <a:endParaRPr lang="en-US" dirty="0"/>
           </a:p>
@@ -3878,8 +3974,8 @@
         </p:nvSpPr>
         <p:spPr>
           <a:xfrm>
-            <a:off x="6324600" y="1544598"/>
-            <a:ext cx="2438400" cy="2951202"/>
+            <a:off x="1905000" y="5410200"/>
+            <a:ext cx="7086600" cy="1143000"/>
           </a:xfrm>
           <a:prstGeom prst="rect">
             <a:avLst/>
@@ -3908,7 +4004,14 @@
             <a:pPr algn="ctr"/>
             <a:r>
               <a:rPr lang="en-US" dirty="0" smtClean="0"/>
-              <a:t>About selected book</a:t>
+              <a:t>Edit</a:t>
+            </a:r>
+          </a:p>
+          <a:p>
+            <a:pPr algn="ctr"/>
+            <a:r>
+              <a:rPr lang="en-US" dirty="0" smtClean="0"/>
+              <a:t>Add/Record</a:t>
             </a:r>
             <a:endParaRPr lang="en-US" dirty="0"/>
           </a:p>
@@ -3916,87 +4019,37 @@
       </p:sp>
       <p:sp>
         <p:nvSpPr>
-          <p:cNvPr id="6" name="Rectangle 5"/>
-          <p:cNvSpPr/>
+          <p:cNvPr id="6" name="TextBox 5"/>
+          <p:cNvSpPr txBox="1"/>
           <p:nvPr/>
         </p:nvSpPr>
         <p:spPr>
           <a:xfrm>
-            <a:off x="6324600" y="4800600"/>
-            <a:ext cx="1219200" cy="1371600"/>
+            <a:off x="457200" y="1392198"/>
+            <a:ext cx="3840154" cy="369332"/>
           </a:xfrm>
           <a:prstGeom prst="rect">
             <a:avLst/>
           </a:prstGeom>
-        </p:spPr>
-        <p:style>
-          <a:lnRef idx="2">
-            <a:schemeClr val="accent1">
-              <a:shade val="50000"/>
-            </a:schemeClr>
-          </a:lnRef>
-          <a:fillRef idx="1">
-            <a:schemeClr val="accent1"/>
-          </a:fillRef>
-          <a:effectRef idx="0">
-            <a:schemeClr val="accent1"/>
-          </a:effectRef>
-          <a:fontRef idx="minor">
-            <a:schemeClr val="lt1"/>
-          </a:fontRef>
-        </p:style>
-        <p:txBody>
-          <a:bodyPr rtlCol="0" anchor="ctr"/>
-          <a:lstStyle/>
-          <a:p>
-            <a:pPr algn="ctr"/>
+          <a:noFill/>
+        </p:spPr>
+        <p:txBody>
+          <a:bodyPr wrap="none" rtlCol="0">
+            <a:spAutoFit/>
+          </a:bodyPr>
+          <a:lstStyle/>
+          <a:p>
             <a:r>
               <a:rPr lang="en-US" dirty="0" smtClean="0"/>
-              <a:t>Download</a:t>
-            </a:r>
-            <a:endParaRPr lang="en-US" dirty="0"/>
-          </a:p>
-        </p:txBody>
-      </p:sp>
-      <p:sp>
-        <p:nvSpPr>
-          <p:cNvPr id="7" name="Rectangle 6"/>
-          <p:cNvSpPr/>
-          <p:nvPr/>
-        </p:nvSpPr>
-        <p:spPr>
-          <a:xfrm>
-            <a:off x="7772400" y="4800600"/>
-            <a:ext cx="990600" cy="1371600"/>
-          </a:xfrm>
-          <a:prstGeom prst="rect">
-            <a:avLst/>
-          </a:prstGeom>
-        </p:spPr>
-        <p:style>
-          <a:lnRef idx="2">
-            <a:schemeClr val="accent1">
-              <a:shade val="50000"/>
-            </a:schemeClr>
-          </a:lnRef>
-          <a:fillRef idx="1">
-            <a:schemeClr val="accent1"/>
-          </a:fillRef>
-          <a:effectRef idx="0">
-            <a:schemeClr val="accent1"/>
-          </a:effectRef>
-          <a:fontRef idx="minor">
-            <a:schemeClr val="lt1"/>
-          </a:fontRef>
-        </p:style>
-        <p:txBody>
-          <a:bodyPr rtlCol="0" anchor="ctr"/>
-          <a:lstStyle/>
-          <a:p>
-            <a:pPr algn="ctr"/>
+              <a:t>Tap book in library, </a:t>
+            </a:r>
+            <a:r>
+              <a:rPr lang="en-US" dirty="0" err="1" smtClean="0"/>
+              <a:t>autofill</a:t>
+            </a:r>
             <a:r>
               <a:rPr lang="en-US" dirty="0" smtClean="0"/>
-              <a:t>Play</a:t>
+              <a:t> form to edit</a:t>
             </a:r>
             <a:endParaRPr lang="en-US" dirty="0"/>
           </a:p>
@@ -4005,7 +4058,7 @@
     </p:spTree>
     <p:extLst>
       <p:ext uri="{BB962C8B-B14F-4D97-AF65-F5344CB8AC3E}">
-        <p14:creationId xmlns:p14="http://schemas.microsoft.com/office/powerpoint/2010/main" val="736180239"/>
+        <p14:creationId xmlns:p14="http://schemas.microsoft.com/office/powerpoint/2010/main" val="144905844"/>
       </p:ext>
     </p:extLst>
   </p:cSld>
@@ -4047,8 +4100,8 @@
         </p:nvSpPr>
         <p:spPr>
           <a:xfrm>
-            <a:off x="4191000" y="835294"/>
-            <a:ext cx="1123641" cy="553998"/>
+            <a:off x="3276600" y="1066800"/>
+            <a:ext cx="1659429" cy="369332"/>
           </a:xfrm>
           <a:prstGeom prst="rect">
             <a:avLst/>
@@ -4062,31 +4115,23 @@
           <a:lstStyle/>
           <a:p>
             <a:r>
-              <a:rPr lang="en-US" sz="3000" dirty="0" smtClean="0">
-                <a:solidFill>
-                  <a:schemeClr val="accent2"/>
-                </a:solidFill>
-              </a:rPr>
-              <a:t>Books</a:t>
-            </a:r>
-            <a:endParaRPr lang="en-US" sz="3000" dirty="0">
-              <a:solidFill>
-                <a:schemeClr val="accent2"/>
-              </a:solidFill>
-            </a:endParaRPr>
-          </a:p>
-        </p:txBody>
-      </p:sp>
-      <p:sp>
-        <p:nvSpPr>
-          <p:cNvPr id="4" name="Rectangle 3"/>
+              <a:rPr lang="en-US" dirty="0" smtClean="0"/>
+              <a:t>Record Consent</a:t>
+            </a:r>
+            <a:endParaRPr lang="en-US" dirty="0"/>
+          </a:p>
+        </p:txBody>
+      </p:sp>
+      <p:sp>
+        <p:nvSpPr>
+          <p:cNvPr id="3" name="Rectangle 2"/>
           <p:cNvSpPr/>
           <p:nvPr/>
         </p:nvSpPr>
         <p:spPr>
           <a:xfrm>
-            <a:off x="533400" y="1676400"/>
-            <a:ext cx="2667000" cy="2209800"/>
+            <a:off x="2514600" y="2362200"/>
+            <a:ext cx="4191000" cy="3124200"/>
           </a:xfrm>
           <a:prstGeom prst="rect">
             <a:avLst/>
@@ -4115,139 +4160,7 @@
             <a:pPr algn="ctr"/>
             <a:r>
               <a:rPr lang="en-US" dirty="0" smtClean="0"/>
-              <a:t>By age level</a:t>
-            </a:r>
-            <a:endParaRPr lang="en-US" dirty="0"/>
-          </a:p>
-        </p:txBody>
-      </p:sp>
-      <p:sp>
-        <p:nvSpPr>
-          <p:cNvPr id="5" name="Rectangle 4"/>
-          <p:cNvSpPr/>
-          <p:nvPr/>
-        </p:nvSpPr>
-        <p:spPr>
-          <a:xfrm>
-            <a:off x="3733800" y="1676400"/>
-            <a:ext cx="2209800" cy="2209800"/>
-          </a:xfrm>
-          <a:prstGeom prst="rect">
-            <a:avLst/>
-          </a:prstGeom>
-        </p:spPr>
-        <p:style>
-          <a:lnRef idx="2">
-            <a:schemeClr val="accent1">
-              <a:shade val="50000"/>
-            </a:schemeClr>
-          </a:lnRef>
-          <a:fillRef idx="1">
-            <a:schemeClr val="accent1"/>
-          </a:fillRef>
-          <a:effectRef idx="0">
-            <a:schemeClr val="accent1"/>
-          </a:effectRef>
-          <a:fontRef idx="minor">
-            <a:schemeClr val="lt1"/>
-          </a:fontRef>
-        </p:style>
-        <p:txBody>
-          <a:bodyPr rtlCol="0" anchor="ctr"/>
-          <a:lstStyle/>
-          <a:p>
-            <a:pPr algn="ctr"/>
-            <a:r>
-              <a:rPr lang="en-US" dirty="0" smtClean="0"/>
-              <a:t>By Grade level</a:t>
-            </a:r>
-            <a:endParaRPr lang="en-US" dirty="0"/>
-          </a:p>
-        </p:txBody>
-      </p:sp>
-      <p:sp>
-        <p:nvSpPr>
-          <p:cNvPr id="6" name="Rectangle 5"/>
-          <p:cNvSpPr/>
-          <p:nvPr/>
-        </p:nvSpPr>
-        <p:spPr>
-          <a:xfrm>
-            <a:off x="6324600" y="1676400"/>
-            <a:ext cx="2362200" cy="2209800"/>
-          </a:xfrm>
-          <a:prstGeom prst="rect">
-            <a:avLst/>
-          </a:prstGeom>
-        </p:spPr>
-        <p:style>
-          <a:lnRef idx="2">
-            <a:schemeClr val="accent1">
-              <a:shade val="50000"/>
-            </a:schemeClr>
-          </a:lnRef>
-          <a:fillRef idx="1">
-            <a:schemeClr val="accent1"/>
-          </a:fillRef>
-          <a:effectRef idx="0">
-            <a:schemeClr val="accent1"/>
-          </a:effectRef>
-          <a:fontRef idx="minor">
-            <a:schemeClr val="lt1"/>
-          </a:fontRef>
-        </p:style>
-        <p:txBody>
-          <a:bodyPr rtlCol="0" anchor="ctr"/>
-          <a:lstStyle/>
-          <a:p>
-            <a:pPr algn="ctr"/>
-            <a:r>
-              <a:rPr lang="en-US" dirty="0" smtClean="0"/>
-              <a:t>Browse all books</a:t>
-            </a:r>
-            <a:endParaRPr lang="en-US" dirty="0"/>
-          </a:p>
-        </p:txBody>
-      </p:sp>
-      <p:sp>
-        <p:nvSpPr>
-          <p:cNvPr id="7" name="Rectangle 6"/>
-          <p:cNvSpPr/>
-          <p:nvPr/>
-        </p:nvSpPr>
-        <p:spPr>
-          <a:xfrm>
-            <a:off x="5314641" y="5181600"/>
-            <a:ext cx="2914959" cy="609600"/>
-          </a:xfrm>
-          <a:prstGeom prst="rect">
-            <a:avLst/>
-          </a:prstGeom>
-        </p:spPr>
-        <p:style>
-          <a:lnRef idx="2">
-            <a:schemeClr val="accent1">
-              <a:shade val="50000"/>
-            </a:schemeClr>
-          </a:lnRef>
-          <a:fillRef idx="1">
-            <a:schemeClr val="accent1"/>
-          </a:fillRef>
-          <a:effectRef idx="0">
-            <a:schemeClr val="accent1"/>
-          </a:effectRef>
-          <a:fontRef idx="minor">
-            <a:schemeClr val="lt1"/>
-          </a:fontRef>
-        </p:style>
-        <p:txBody>
-          <a:bodyPr rtlCol="0" anchor="ctr"/>
-          <a:lstStyle/>
-          <a:p>
-            <a:pPr algn="ctr"/>
-            <a:r>
-              <a:rPr lang="en-US" dirty="0" smtClean="0"/>
-              <a:t>Request a book</a:t>
+              <a:t>Text</a:t>
             </a:r>
             <a:endParaRPr lang="en-US" dirty="0"/>
           </a:p>
@@ -4256,20 +4169,13 @@
     </p:spTree>
     <p:extLst>
       <p:ext uri="{BB962C8B-B14F-4D97-AF65-F5344CB8AC3E}">
-        <p14:creationId xmlns:p14="http://schemas.microsoft.com/office/powerpoint/2010/main" val="529307366"/>
+        <p14:creationId xmlns:p14="http://schemas.microsoft.com/office/powerpoint/2010/main" val="4030718503"/>
       </p:ext>
     </p:extLst>
   </p:cSld>
   <p:clrMapOvr>
     <a:masterClrMapping/>
   </p:clrMapOvr>
-  <p:timing>
-    <p:tnLst>
-      <p:par>
-        <p:cTn id="1" dur="indefinite" restart="never" nodeType="tmRoot"/>
-      </p:par>
-    </p:tnLst>
-  </p:timing>
 </p:sld>
 </file>
 
@@ -4298,8 +4204,8 @@
         </p:nvSpPr>
         <p:spPr>
           <a:xfrm>
-            <a:off x="4191262" y="838200"/>
-            <a:ext cx="1143262" cy="553998"/>
+            <a:off x="3124200" y="1447800"/>
+            <a:ext cx="2870338" cy="369332"/>
           </a:xfrm>
           <a:prstGeom prst="rect">
             <a:avLst/>
@@ -4312,20 +4218,11 @@
           </a:bodyPr>
           <a:lstStyle/>
           <a:p>
-            <a:pPr algn="ctr"/>
-            <a:r>
-              <a:rPr lang="en-US" sz="3000" dirty="0" smtClean="0">
-                <a:solidFill>
-                  <a:schemeClr val="accent2"/>
-                </a:solidFill>
-              </a:rPr>
-              <a:t>About</a:t>
-            </a:r>
-            <a:endParaRPr lang="en-US" sz="3000" dirty="0">
-              <a:solidFill>
-                <a:schemeClr val="accent2"/>
-              </a:solidFill>
-            </a:endParaRPr>
+            <a:r>
+              <a:rPr lang="en-US" dirty="0" smtClean="0"/>
+              <a:t>Record: Info about recording</a:t>
+            </a:r>
+            <a:endParaRPr lang="en-US" dirty="0"/>
           </a:p>
         </p:txBody>
       </p:sp>
@@ -4337,8 +4234,8 @@
         </p:nvSpPr>
         <p:spPr>
           <a:xfrm>
-            <a:off x="762000" y="1497842"/>
-            <a:ext cx="7543800" cy="2743200"/>
+            <a:off x="914400" y="2209800"/>
+            <a:ext cx="7620000" cy="4191000"/>
           </a:xfrm>
           <a:prstGeom prst="rect">
             <a:avLst/>
@@ -4365,24 +4262,88 @@
           <a:lstStyle/>
           <a:p>
             <a:pPr algn="ctr"/>
-            <a:r>
-              <a:rPr lang="en-US" dirty="0" smtClean="0"/>
-              <a:t>About RRR</a:t>
-            </a:r>
-            <a:endParaRPr lang="en-US" dirty="0"/>
-          </a:p>
-        </p:txBody>
-      </p:sp>
-      <p:sp>
-        <p:nvSpPr>
-          <p:cNvPr id="4" name="Rectangle 3"/>
+            <a:endParaRPr lang="en-US"/>
+          </a:p>
+        </p:txBody>
+      </p:sp>
+    </p:spTree>
+    <p:extLst>
+      <p:ext uri="{BB962C8B-B14F-4D97-AF65-F5344CB8AC3E}">
+        <p14:creationId xmlns:p14="http://schemas.microsoft.com/office/powerpoint/2010/main" val="4157084865"/>
+      </p:ext>
+    </p:extLst>
+  </p:cSld>
+  <p:clrMapOvr>
+    <a:masterClrMapping/>
+  </p:clrMapOvr>
+</p:sld>
+</file>
+
+<file path=ppt/slides/slide7.xml><?xml version="1.0" encoding="utf-8"?>
+<p:sld xmlns:a="http://schemas.openxmlformats.org/drawingml/2006/main" xmlns:r="http://schemas.openxmlformats.org/officeDocument/2006/relationships" xmlns:p="http://schemas.openxmlformats.org/presentationml/2006/main">
+  <p:cSld>
+    <p:spTree>
+      <p:nvGrpSpPr>
+        <p:cNvPr id="1" name=""/>
+        <p:cNvGrpSpPr/>
+        <p:nvPr/>
+      </p:nvGrpSpPr>
+      <p:grpSpPr>
+        <a:xfrm>
+          <a:off x="0" y="0"/>
+          <a:ext cx="0" cy="0"/>
+          <a:chOff x="0" y="0"/>
+          <a:chExt cx="0" cy="0"/>
+        </a:xfrm>
+      </p:grpSpPr>
+      <p:sp>
+        <p:nvSpPr>
+          <p:cNvPr id="2" name="TextBox 1"/>
+          <p:cNvSpPr txBox="1"/>
+          <p:nvPr/>
+        </p:nvSpPr>
+        <p:spPr>
+          <a:xfrm>
+            <a:off x="2895600" y="914400"/>
+            <a:ext cx="837602" cy="369332"/>
+          </a:xfrm>
+          <a:prstGeom prst="rect">
+            <a:avLst/>
+          </a:prstGeom>
+          <a:noFill/>
+        </p:spPr>
+        <p:txBody>
+          <a:bodyPr wrap="none" rtlCol="0">
+            <a:spAutoFit/>
+          </a:bodyPr>
+          <a:lstStyle/>
+          <a:p>
+            <a:r>
+              <a:rPr lang="en-US" dirty="0" smtClean="0">
+                <a:solidFill>
+                  <a:srgbClr val="FF0000"/>
+                </a:solidFill>
+              </a:rPr>
+              <a:t>Record</a:t>
+            </a:r>
+            <a:endParaRPr lang="en-US" dirty="0">
+              <a:solidFill>
+                <a:srgbClr val="FF0000"/>
+              </a:solidFill>
+            </a:endParaRPr>
+          </a:p>
+        </p:txBody>
+      </p:sp>
+      <p:sp>
+        <p:nvSpPr>
+          <p:cNvPr id="3" name="Rectangle 2"/>
           <p:cNvSpPr/>
           <p:nvPr/>
         </p:nvSpPr>
         <p:spPr>
           <a:xfrm>
-            <a:off x="727881" y="4545842"/>
-            <a:ext cx="1371600" cy="1371600"/>
+            <a:off x="685800" y="1905000"/>
+            <a:ext cx="7848600" cy="2057400"/>
           </a:xfrm>
           <a:prstGeom prst="rect">
             <a:avLst/>
@@ -4411,7 +4372,7 @@
             <a:pPr algn="ctr"/>
             <a:r>
               <a:rPr lang="en-US" dirty="0" smtClean="0"/>
-              <a:t>Team member</a:t>
+              <a:t>Record</a:t>
             </a:r>
             <a:endParaRPr lang="en-US" dirty="0"/>
           </a:p>
@@ -4419,14 +4380,143 @@
       </p:sp>
       <p:sp>
         <p:nvSpPr>
-          <p:cNvPr id="6" name="Rectangle 5"/>
+          <p:cNvPr id="4" name="TextBox 3"/>
+          <p:cNvSpPr txBox="1"/>
+          <p:nvPr/>
+        </p:nvSpPr>
+        <p:spPr>
+          <a:xfrm>
+            <a:off x="7162800" y="4953000"/>
+            <a:ext cx="1371600" cy="369332"/>
+          </a:xfrm>
+          <a:prstGeom prst="rect">
+            <a:avLst/>
+          </a:prstGeom>
+          <a:noFill/>
+        </p:spPr>
+        <p:txBody>
+          <a:bodyPr wrap="square" rtlCol="0">
+            <a:spAutoFit/>
+          </a:bodyPr>
+          <a:lstStyle/>
+          <a:p>
+            <a:r>
+              <a:rPr lang="en-US" dirty="0" smtClean="0"/>
+              <a:t>Upload</a:t>
+            </a:r>
+            <a:endParaRPr lang="en-US" dirty="0"/>
+          </a:p>
+        </p:txBody>
+      </p:sp>
+      <p:sp>
+        <p:nvSpPr>
+          <p:cNvPr id="6" name="TextBox 5"/>
+          <p:cNvSpPr txBox="1"/>
+          <p:nvPr/>
+        </p:nvSpPr>
+        <p:spPr>
+          <a:xfrm>
+            <a:off x="838200" y="4267200"/>
+            <a:ext cx="2372252" cy="369332"/>
+          </a:xfrm>
+          <a:prstGeom prst="rect">
+            <a:avLst/>
+          </a:prstGeom>
+          <a:noFill/>
+        </p:spPr>
+        <p:txBody>
+          <a:bodyPr wrap="none" rtlCol="0">
+            <a:spAutoFit/>
+          </a:bodyPr>
+          <a:lstStyle/>
+          <a:p>
+            <a:r>
+              <a:rPr lang="en-US" dirty="0" smtClean="0"/>
+              <a:t>Page flip, pause, record</a:t>
+            </a:r>
+            <a:endParaRPr lang="en-US" dirty="0"/>
+          </a:p>
+        </p:txBody>
+      </p:sp>
+    </p:spTree>
+    <p:extLst>
+      <p:ext uri="{BB962C8B-B14F-4D97-AF65-F5344CB8AC3E}">
+        <p14:creationId xmlns:p14="http://schemas.microsoft.com/office/powerpoint/2010/main" val="1054999761"/>
+      </p:ext>
+    </p:extLst>
+  </p:cSld>
+  <p:clrMapOvr>
+    <a:masterClrMapping/>
+  </p:clrMapOvr>
+</p:sld>
+</file>
+
+<file path=ppt/slides/slide8.xml><?xml version="1.0" encoding="utf-8"?>
+<p:sld xmlns:a="http://schemas.openxmlformats.org/drawingml/2006/main" xmlns:r="http://schemas.openxmlformats.org/officeDocument/2006/relationships" xmlns:p="http://schemas.openxmlformats.org/presentationml/2006/main">
+  <p:cSld>
+    <p:spTree>
+      <p:nvGrpSpPr>
+        <p:cNvPr id="1" name=""/>
+        <p:cNvGrpSpPr/>
+        <p:nvPr/>
+      </p:nvGrpSpPr>
+      <p:grpSpPr>
+        <a:xfrm>
+          <a:off x="0" y="0"/>
+          <a:ext cx="0" cy="0"/>
+          <a:chOff x="0" y="0"/>
+          <a:chExt cx="0" cy="0"/>
+        </a:xfrm>
+      </p:grpSpPr>
+      <p:sp>
+        <p:nvSpPr>
+          <p:cNvPr id="2" name="TextBox 1"/>
+          <p:cNvSpPr txBox="1"/>
+          <p:nvPr/>
+        </p:nvSpPr>
+        <p:spPr>
+          <a:xfrm>
+            <a:off x="2209800" y="990600"/>
+            <a:ext cx="4876800" cy="553998"/>
+          </a:xfrm>
+          <a:prstGeom prst="rect">
+            <a:avLst/>
+          </a:prstGeom>
+          <a:noFill/>
+        </p:spPr>
+        <p:txBody>
+          <a:bodyPr wrap="square" rtlCol="0">
+            <a:spAutoFit/>
+          </a:bodyPr>
+          <a:lstStyle/>
+          <a:p>
+            <a:pPr algn="ctr"/>
+            <a:r>
+              <a:rPr lang="en-US" sz="3000" dirty="0" smtClean="0">
+                <a:solidFill>
+                  <a:schemeClr val="accent2"/>
+                </a:solidFill>
+              </a:rPr>
+              <a:t>Replay</a:t>
+            </a:r>
+            <a:endParaRPr lang="en-US" sz="3000" dirty="0">
+              <a:solidFill>
+                <a:schemeClr val="accent2"/>
+              </a:solidFill>
+            </a:endParaRPr>
+          </a:p>
+        </p:txBody>
+      </p:sp>
+      <p:sp>
+        <p:nvSpPr>
+          <p:cNvPr id="3" name="Rectangle 2"/>
           <p:cNvSpPr/>
           <p:nvPr/>
         </p:nvSpPr>
         <p:spPr>
           <a:xfrm>
-            <a:off x="2362200" y="4545842"/>
-            <a:ext cx="1371600" cy="1371600"/>
+            <a:off x="304800" y="1544598"/>
+            <a:ext cx="2514600" cy="4627602"/>
           </a:xfrm>
           <a:prstGeom prst="rect">
             <a:avLst/>
@@ -4455,7 +4545,7 @@
             <a:pPr algn="ctr"/>
             <a:r>
               <a:rPr lang="en-US" dirty="0" smtClean="0"/>
-              <a:t>Team member</a:t>
+              <a:t>Library</a:t>
             </a:r>
             <a:endParaRPr lang="en-US" dirty="0"/>
           </a:p>
@@ -4463,14 +4553,14 @@
       </p:sp>
       <p:sp>
         <p:nvSpPr>
-          <p:cNvPr id="7" name="Rectangle 6"/>
+          <p:cNvPr id="4" name="Rectangle 3"/>
           <p:cNvSpPr/>
           <p:nvPr/>
         </p:nvSpPr>
         <p:spPr>
           <a:xfrm>
-            <a:off x="3886200" y="4545842"/>
-            <a:ext cx="1371600" cy="1371600"/>
+            <a:off x="3429000" y="1544598"/>
+            <a:ext cx="2514600" cy="4627602"/>
           </a:xfrm>
           <a:prstGeom prst="rect">
             <a:avLst/>
@@ -4499,7 +4589,7 @@
             <a:pPr algn="ctr"/>
             <a:r>
               <a:rPr lang="en-US" dirty="0" smtClean="0"/>
-              <a:t>Team member</a:t>
+              <a:t>Selected book</a:t>
             </a:r>
             <a:endParaRPr lang="en-US" dirty="0"/>
           </a:p>
@@ -4507,14 +4597,14 @@
       </p:sp>
       <p:sp>
         <p:nvSpPr>
-          <p:cNvPr id="8" name="Rectangle 7"/>
+          <p:cNvPr id="5" name="Rectangle 4"/>
           <p:cNvSpPr/>
           <p:nvPr/>
         </p:nvSpPr>
         <p:spPr>
           <a:xfrm>
-            <a:off x="5410200" y="4534469"/>
-            <a:ext cx="1371600" cy="1371600"/>
+            <a:off x="6324600" y="1544598"/>
+            <a:ext cx="2438400" cy="2951202"/>
           </a:xfrm>
           <a:prstGeom prst="rect">
             <a:avLst/>
@@ -4543,7 +4633,7 @@
             <a:pPr algn="ctr"/>
             <a:r>
               <a:rPr lang="en-US" dirty="0" smtClean="0"/>
-              <a:t>Team member</a:t>
+              <a:t>About selected book</a:t>
             </a:r>
             <a:endParaRPr lang="en-US" dirty="0"/>
           </a:p>
@@ -4551,14 +4641,14 @@
       </p:sp>
       <p:sp>
         <p:nvSpPr>
-          <p:cNvPr id="9" name="Rectangle 8"/>
+          <p:cNvPr id="6" name="Rectangle 5"/>
           <p:cNvSpPr/>
           <p:nvPr/>
         </p:nvSpPr>
         <p:spPr>
           <a:xfrm>
-            <a:off x="6934200" y="4534469"/>
-            <a:ext cx="1371600" cy="1371600"/>
+            <a:off x="6324600" y="4800600"/>
+            <a:ext cx="1219200" cy="1371600"/>
           </a:xfrm>
           <a:prstGeom prst="rect">
             <a:avLst/>
@@ -4587,7 +4677,7 @@
             <a:pPr algn="ctr"/>
             <a:r>
               <a:rPr lang="en-US" dirty="0" smtClean="0"/>
-              <a:t>Team member</a:t>
+              <a:t>Download</a:t>
             </a:r>
             <a:endParaRPr lang="en-US" dirty="0"/>
           </a:p>
@@ -4595,14 +4685,95 @@
       </p:sp>
       <p:sp>
         <p:nvSpPr>
-          <p:cNvPr id="10" name="TextBox 9"/>
+          <p:cNvPr id="7" name="Rectangle 6"/>
+          <p:cNvSpPr/>
+          <p:nvPr/>
+        </p:nvSpPr>
+        <p:spPr>
+          <a:xfrm>
+            <a:off x="7772400" y="4800600"/>
+            <a:ext cx="990600" cy="1371600"/>
+          </a:xfrm>
+          <a:prstGeom prst="rect">
+            <a:avLst/>
+          </a:prstGeom>
+        </p:spPr>
+        <p:style>
+          <a:lnRef idx="2">
+            <a:schemeClr val="accent1">
+              <a:shade val="50000"/>
+            </a:schemeClr>
+          </a:lnRef>
+          <a:fillRef idx="1">
+            <a:schemeClr val="accent1"/>
+          </a:fillRef>
+          <a:effectRef idx="0">
+            <a:schemeClr val="accent1"/>
+          </a:effectRef>
+          <a:fontRef idx="minor">
+            <a:schemeClr val="lt1"/>
+          </a:fontRef>
+        </p:style>
+        <p:txBody>
+          <a:bodyPr rtlCol="0" anchor="ctr"/>
+          <a:lstStyle/>
+          <a:p>
+            <a:pPr algn="ctr"/>
+            <a:r>
+              <a:rPr lang="en-US" dirty="0" smtClean="0"/>
+              <a:t>Play</a:t>
+            </a:r>
+            <a:endParaRPr lang="en-US" dirty="0"/>
+          </a:p>
+        </p:txBody>
+      </p:sp>
+    </p:spTree>
+    <p:extLst>
+      <p:ext uri="{BB962C8B-B14F-4D97-AF65-F5344CB8AC3E}">
+        <p14:creationId xmlns:p14="http://schemas.microsoft.com/office/powerpoint/2010/main" val="736180239"/>
+      </p:ext>
+    </p:extLst>
+  </p:cSld>
+  <p:clrMapOvr>
+    <a:masterClrMapping/>
+  </p:clrMapOvr>
+  <p:timing>
+    <p:tnLst>
+      <p:par>
+        <p:cTn id="1" dur="indefinite" restart="never" nodeType="tmRoot"/>
+      </p:par>
+    </p:tnLst>
+  </p:timing>
+</p:sld>
+</file>
+
+<file path=ppt/slides/slide9.xml><?xml version="1.0" encoding="utf-8"?>
+<p:sld xmlns:a="http://schemas.openxmlformats.org/drawingml/2006/main" xmlns:r="http://schemas.openxmlformats.org/officeDocument/2006/relationships" xmlns:p="http://schemas.openxmlformats.org/presentationml/2006/main">
+  <p:cSld>
+    <p:spTree>
+      <p:nvGrpSpPr>
+        <p:cNvPr id="1" name=""/>
+        <p:cNvGrpSpPr/>
+        <p:nvPr/>
+      </p:nvGrpSpPr>
+      <p:grpSpPr>
+        <a:xfrm>
+          <a:off x="0" y="0"/>
+          <a:ext cx="0" cy="0"/>
+          <a:chOff x="0" y="0"/>
+          <a:chExt cx="0" cy="0"/>
+        </a:xfrm>
+      </p:grpSpPr>
+      <p:sp>
+        <p:nvSpPr>
+          <p:cNvPr id="2" name="TextBox 1"/>
           <p:cNvSpPr txBox="1"/>
           <p:nvPr/>
         </p:nvSpPr>
         <p:spPr>
           <a:xfrm>
-            <a:off x="4533900" y="6063734"/>
-            <a:ext cx="3321807" cy="369332"/>
+            <a:off x="4191000" y="835294"/>
+            <a:ext cx="1123641" cy="553998"/>
           </a:xfrm>
           <a:prstGeom prst="rect">
             <a:avLst/>
@@ -4616,8 +4787,192 @@
           <a:lstStyle/>
           <a:p>
             <a:r>
+              <a:rPr lang="en-US" sz="3000" dirty="0" smtClean="0">
+                <a:solidFill>
+                  <a:schemeClr val="accent2"/>
+                </a:solidFill>
+              </a:rPr>
+              <a:t>Books</a:t>
+            </a:r>
+            <a:endParaRPr lang="en-US" sz="3000" dirty="0">
+              <a:solidFill>
+                <a:schemeClr val="accent2"/>
+              </a:solidFill>
+            </a:endParaRPr>
+          </a:p>
+        </p:txBody>
+      </p:sp>
+      <p:sp>
+        <p:nvSpPr>
+          <p:cNvPr id="4" name="Rectangle 3"/>
+          <p:cNvSpPr/>
+          <p:nvPr/>
+        </p:nvSpPr>
+        <p:spPr>
+          <a:xfrm>
+            <a:off x="533400" y="1676400"/>
+            <a:ext cx="2667000" cy="2209800"/>
+          </a:xfrm>
+          <a:prstGeom prst="rect">
+            <a:avLst/>
+          </a:prstGeom>
+        </p:spPr>
+        <p:style>
+          <a:lnRef idx="2">
+            <a:schemeClr val="accent1">
+              <a:shade val="50000"/>
+            </a:schemeClr>
+          </a:lnRef>
+          <a:fillRef idx="1">
+            <a:schemeClr val="accent1"/>
+          </a:fillRef>
+          <a:effectRef idx="0">
+            <a:schemeClr val="accent1"/>
+          </a:effectRef>
+          <a:fontRef idx="minor">
+            <a:schemeClr val="lt1"/>
+          </a:fontRef>
+        </p:style>
+        <p:txBody>
+          <a:bodyPr rtlCol="0" anchor="ctr"/>
+          <a:lstStyle/>
+          <a:p>
+            <a:pPr algn="ctr"/>
+            <a:r>
               <a:rPr lang="en-US" dirty="0" smtClean="0"/>
-              <a:t>Mouse over pictures for short bio</a:t>
+              <a:t>By age level</a:t>
+            </a:r>
+            <a:endParaRPr lang="en-US" dirty="0"/>
+          </a:p>
+        </p:txBody>
+      </p:sp>
+      <p:sp>
+        <p:nvSpPr>
+          <p:cNvPr id="5" name="Rectangle 4"/>
+          <p:cNvSpPr/>
+          <p:nvPr/>
+        </p:nvSpPr>
+        <p:spPr>
+          <a:xfrm>
+            <a:off x="3733800" y="1676400"/>
+            <a:ext cx="2209800" cy="2209800"/>
+          </a:xfrm>
+          <a:prstGeom prst="rect">
+            <a:avLst/>
+          </a:prstGeom>
+        </p:spPr>
+        <p:style>
+          <a:lnRef idx="2">
+            <a:schemeClr val="accent1">
+              <a:shade val="50000"/>
+            </a:schemeClr>
+          </a:lnRef>
+          <a:fillRef idx="1">
+            <a:schemeClr val="accent1"/>
+          </a:fillRef>
+          <a:effectRef idx="0">
+            <a:schemeClr val="accent1"/>
+          </a:effectRef>
+          <a:fontRef idx="minor">
+            <a:schemeClr val="lt1"/>
+          </a:fontRef>
+        </p:style>
+        <p:txBody>
+          <a:bodyPr rtlCol="0" anchor="ctr"/>
+          <a:lstStyle/>
+          <a:p>
+            <a:pPr algn="ctr"/>
+            <a:r>
+              <a:rPr lang="en-US" dirty="0" smtClean="0"/>
+              <a:t>By Grade level</a:t>
+            </a:r>
+            <a:endParaRPr lang="en-US" dirty="0"/>
+          </a:p>
+        </p:txBody>
+      </p:sp>
+      <p:sp>
+        <p:nvSpPr>
+          <p:cNvPr id="6" name="Rectangle 5"/>
+          <p:cNvSpPr/>
+          <p:nvPr/>
+        </p:nvSpPr>
+        <p:spPr>
+          <a:xfrm>
+            <a:off x="6324600" y="1676400"/>
+            <a:ext cx="2362200" cy="2209800"/>
+          </a:xfrm>
+          <a:prstGeom prst="rect">
+            <a:avLst/>
+          </a:prstGeom>
+        </p:spPr>
+        <p:style>
+          <a:lnRef idx="2">
+            <a:schemeClr val="accent1">
+              <a:shade val="50000"/>
+            </a:schemeClr>
+          </a:lnRef>
+          <a:fillRef idx="1">
+            <a:schemeClr val="accent1"/>
+          </a:fillRef>
+          <a:effectRef idx="0">
+            <a:schemeClr val="accent1"/>
+          </a:effectRef>
+          <a:fontRef idx="minor">
+            <a:schemeClr val="lt1"/>
+          </a:fontRef>
+        </p:style>
+        <p:txBody>
+          <a:bodyPr rtlCol="0" anchor="ctr"/>
+          <a:lstStyle/>
+          <a:p>
+            <a:pPr algn="ctr"/>
+            <a:r>
+              <a:rPr lang="en-US" dirty="0" smtClean="0"/>
+              <a:t>Browse all books</a:t>
+            </a:r>
+            <a:endParaRPr lang="en-US" dirty="0"/>
+          </a:p>
+        </p:txBody>
+      </p:sp>
+      <p:sp>
+        <p:nvSpPr>
+          <p:cNvPr id="7" name="Rectangle 6"/>
+          <p:cNvSpPr/>
+          <p:nvPr/>
+        </p:nvSpPr>
+        <p:spPr>
+          <a:xfrm>
+            <a:off x="5314641" y="5181600"/>
+            <a:ext cx="2914959" cy="609600"/>
+          </a:xfrm>
+          <a:prstGeom prst="rect">
+            <a:avLst/>
+          </a:prstGeom>
+        </p:spPr>
+        <p:style>
+          <a:lnRef idx="2">
+            <a:schemeClr val="accent1">
+              <a:shade val="50000"/>
+            </a:schemeClr>
+          </a:lnRef>
+          <a:fillRef idx="1">
+            <a:schemeClr val="accent1"/>
+          </a:fillRef>
+          <a:effectRef idx="0">
+            <a:schemeClr val="accent1"/>
+          </a:effectRef>
+          <a:fontRef idx="minor">
+            <a:schemeClr val="lt1"/>
+          </a:fontRef>
+        </p:style>
+        <p:txBody>
+          <a:bodyPr rtlCol="0" anchor="ctr"/>
+          <a:lstStyle/>
+          <a:p>
+            <a:pPr algn="ctr"/>
+            <a:r>
+              <a:rPr lang="en-US" dirty="0" smtClean="0"/>
+              <a:t>Request a book</a:t>
             </a:r>
             <a:endParaRPr lang="en-US" dirty="0"/>
           </a:p>
@@ -4626,7 +4981,7 @@
     </p:spTree>
     <p:extLst>
       <p:ext uri="{BB962C8B-B14F-4D97-AF65-F5344CB8AC3E}">
-        <p14:creationId xmlns:p14="http://schemas.microsoft.com/office/powerpoint/2010/main" val="2136350444"/>
+        <p14:creationId xmlns:p14="http://schemas.microsoft.com/office/powerpoint/2010/main" val="529307366"/>
       </p:ext>
     </p:extLst>
   </p:cSld>

</xml_diff>